<commit_message>
erase in ms files + unsupported extension handling
</commit_message>
<xml_diff>
--- a/testfiles/redteam_prezka.pptx
+++ b/testfiles/redteam_prezka.pptx
@@ -3973,7 +3973,7 @@
           <a:p>
             <a:fld id="{929DBB6D-03B3-4D2A-8422-93074E76C525}" type="datetimeFigureOut">
               <a:rPr lang="pl-PL" smtClean="0"/>
-              <a:t>13.03.2023</a:t>
+              <a:t>25.04.2023</a:t>
             </a:fld>
             <a:endParaRPr lang="pl-PL"/>
           </a:p>
@@ -4171,7 +4171,7 @@
           <a:p>
             <a:fld id="{929DBB6D-03B3-4D2A-8422-93074E76C525}" type="datetimeFigureOut">
               <a:rPr lang="pl-PL" smtClean="0"/>
-              <a:t>13.03.2023</a:t>
+              <a:t>25.04.2023</a:t>
             </a:fld>
             <a:endParaRPr lang="pl-PL"/>
           </a:p>
@@ -4379,7 +4379,7 @@
           <a:p>
             <a:fld id="{929DBB6D-03B3-4D2A-8422-93074E76C525}" type="datetimeFigureOut">
               <a:rPr lang="pl-PL" smtClean="0"/>
-              <a:t>13.03.2023</a:t>
+              <a:t>25.04.2023</a:t>
             </a:fld>
             <a:endParaRPr lang="pl-PL"/>
           </a:p>
@@ -4577,7 +4577,7 @@
           <a:p>
             <a:fld id="{929DBB6D-03B3-4D2A-8422-93074E76C525}" type="datetimeFigureOut">
               <a:rPr lang="pl-PL" smtClean="0"/>
-              <a:t>13.03.2023</a:t>
+              <a:t>25.04.2023</a:t>
             </a:fld>
             <a:endParaRPr lang="pl-PL"/>
           </a:p>
@@ -4852,7 +4852,7 @@
           <a:p>
             <a:fld id="{929DBB6D-03B3-4D2A-8422-93074E76C525}" type="datetimeFigureOut">
               <a:rPr lang="pl-PL" smtClean="0"/>
-              <a:t>13.03.2023</a:t>
+              <a:t>25.04.2023</a:t>
             </a:fld>
             <a:endParaRPr lang="pl-PL"/>
           </a:p>
@@ -5117,7 +5117,7 @@
           <a:p>
             <a:fld id="{929DBB6D-03B3-4D2A-8422-93074E76C525}" type="datetimeFigureOut">
               <a:rPr lang="pl-PL" smtClean="0"/>
-              <a:t>13.03.2023</a:t>
+              <a:t>25.04.2023</a:t>
             </a:fld>
             <a:endParaRPr lang="pl-PL"/>
           </a:p>
@@ -5529,7 +5529,7 @@
           <a:p>
             <a:fld id="{929DBB6D-03B3-4D2A-8422-93074E76C525}" type="datetimeFigureOut">
               <a:rPr lang="pl-PL" smtClean="0"/>
-              <a:t>13.03.2023</a:t>
+              <a:t>25.04.2023</a:t>
             </a:fld>
             <a:endParaRPr lang="pl-PL"/>
           </a:p>
@@ -5670,7 +5670,7 @@
           <a:p>
             <a:fld id="{929DBB6D-03B3-4D2A-8422-93074E76C525}" type="datetimeFigureOut">
               <a:rPr lang="pl-PL" smtClean="0"/>
-              <a:t>13.03.2023</a:t>
+              <a:t>25.04.2023</a:t>
             </a:fld>
             <a:endParaRPr lang="pl-PL"/>
           </a:p>
@@ -5783,7 +5783,7 @@
           <a:p>
             <a:fld id="{929DBB6D-03B3-4D2A-8422-93074E76C525}" type="datetimeFigureOut">
               <a:rPr lang="pl-PL" smtClean="0"/>
-              <a:t>13.03.2023</a:t>
+              <a:t>25.04.2023</a:t>
             </a:fld>
             <a:endParaRPr lang="pl-PL"/>
           </a:p>
@@ -6094,7 +6094,7 @@
           <a:p>
             <a:fld id="{929DBB6D-03B3-4D2A-8422-93074E76C525}" type="datetimeFigureOut">
               <a:rPr lang="pl-PL" smtClean="0"/>
-              <a:t>13.03.2023</a:t>
+              <a:t>25.04.2023</a:t>
             </a:fld>
             <a:endParaRPr lang="pl-PL"/>
           </a:p>
@@ -6382,7 +6382,7 @@
           <a:p>
             <a:fld id="{929DBB6D-03B3-4D2A-8422-93074E76C525}" type="datetimeFigureOut">
               <a:rPr lang="pl-PL" smtClean="0"/>
-              <a:t>13.03.2023</a:t>
+              <a:t>25.04.2023</a:t>
             </a:fld>
             <a:endParaRPr lang="pl-PL"/>
           </a:p>
@@ -6623,7 +6623,7 @@
           <a:p>
             <a:fld id="{929DBB6D-03B3-4D2A-8422-93074E76C525}" type="datetimeFigureOut">
               <a:rPr lang="pl-PL" smtClean="0"/>
-              <a:t>13.03.2023</a:t>
+              <a:t>25.04.2023</a:t>
             </a:fld>
             <a:endParaRPr lang="pl-PL"/>
           </a:p>

</xml_diff>